<commit_message>
Update 21.4.3 Monalco Value Drive Tree Jeff Kwan - Redo.pptx
</commit_message>
<xml_diff>
--- a/Unit21/21.4.3 Monalco Value Drive Tree Jeff Kwan - Redo.pptx
+++ b/Unit21/21.4.3 Monalco Value Drive Tree Jeff Kwan - Redo.pptx
@@ -262,7 +262,7 @@
       <p15:sldGuideLst xmlns:p15="http://schemas.microsoft.com/office/powerpoint/2012/main"/>
     </p:ext>
     <p:ext uri="http://customooxmlschemas.google.com/">
-      <go:slidesCustomData xmlns:go="http://customooxmlschemas.google.com/" xmlns:ahyp="http://schemas.microsoft.com/office/drawing/2018/hyperlinkcolor" xmlns:p15="http://schemas.microsoft.com/office/powerpoint/2012/main" xmlns:p14="http://schemas.microsoft.com/office/powerpoint/2010/main" xmlns:com="http://schemas.openxmlformats.org/drawingml/2006/compatibility" xmlns:pvml="urn:schemas-microsoft-com:office:powerpoint" xmlns:v="urn:schemas-microsoft-com:vml" xmlns:o="urn:schemas-microsoft-com:office:office" xmlns:dgm="http://schemas.openxmlformats.org/drawingml/2006/diagram" xmlns:c="http://schemas.openxmlformats.org/drawingml/2006/chart" xmlns:mv="urn:schemas-microsoft-com:mac:vml" xmlns:mc="http://schemas.openxmlformats.org/markup-compatibility/2006" xmlns="" r:id="rId12" roundtripDataSignature="AMtx7mhT1GfyeklW8lpa6sxngyg0nzj6nQ=="/>
+      <go:slidesCustomData xmlns="" xmlns:mc="http://schemas.openxmlformats.org/markup-compatibility/2006" xmlns:mv="urn:schemas-microsoft-com:mac:vml" xmlns:c="http://schemas.openxmlformats.org/drawingml/2006/chart" xmlns:dgm="http://schemas.openxmlformats.org/drawingml/2006/diagram" xmlns:o="urn:schemas-microsoft-com:office:office" xmlns:v="urn:schemas-microsoft-com:vml" xmlns:pvml="urn:schemas-microsoft-com:office:powerpoint" xmlns:com="http://schemas.openxmlformats.org/drawingml/2006/compatibility" xmlns:p14="http://schemas.microsoft.com/office/powerpoint/2010/main" xmlns:p15="http://schemas.microsoft.com/office/powerpoint/2012/main" xmlns:ahyp="http://schemas.microsoft.com/office/drawing/2018/hyperlinkcolor" xmlns:go="http://customooxmlschemas.google.com/" r:id="rId12" roundtripDataSignature="AMtx7mhT1GfyeklW8lpa6sxngyg0nzj6nQ=="/>
     </p:ext>
   </p:extLst>
 </p:presentation>
@@ -5136,9 +5136,9 @@
         <p:grpSpPr>
           <a:xfrm>
             <a:off x="4133800" y="1906900"/>
-            <a:ext cx="906630" cy="380641"/>
+            <a:ext cx="1009042" cy="380641"/>
             <a:chOff x="4934192" y="1056229"/>
-            <a:chExt cx="1131757" cy="444628"/>
+            <a:chExt cx="1259599" cy="444628"/>
           </a:xfrm>
         </p:grpSpPr>
         <p:sp>
@@ -5339,8 +5339,8 @@
           </p:nvSpPr>
           <p:spPr>
             <a:xfrm>
-              <a:off x="5713681" y="1080555"/>
-              <a:ext cx="329898" cy="117100"/>
+              <a:off x="5863893" y="1080597"/>
+              <a:ext cx="329898" cy="128377"/>
             </a:xfrm>
             <a:prstGeom prst="rect">
               <a:avLst/>
@@ -5374,7 +5374,7 @@
                 <a:buNone/>
               </a:pPr>
               <a:r>
-                <a:rPr lang="en-US" sz="714" b="1" i="0" u="none" strike="noStrike" cap="none">
+                <a:rPr lang="en-US" sz="714" b="1" i="0" u="none" strike="noStrike" cap="none" dirty="0">
                   <a:solidFill>
                     <a:srgbClr val="FFFFFF"/>
                   </a:solidFill>
@@ -5383,9 +5383,9 @@
                   <a:cs typeface="Arial"/>
                   <a:sym typeface="Arial"/>
                 </a:rPr>
-                <a:t>(unit)</a:t>
+                <a:t>($)</a:t>
               </a:r>
-              <a:endParaRPr sz="1400" b="0" i="0" u="none" strike="noStrike" cap="none">
+              <a:endParaRPr sz="1400" b="0" i="0" u="none" strike="noStrike" cap="none" dirty="0">
                 <a:solidFill>
                   <a:srgbClr val="000000"/>
                 </a:solidFill>
@@ -5406,10 +5406,10 @@
         </p:nvGrpSpPr>
         <p:grpSpPr>
           <a:xfrm>
-            <a:off x="4133799" y="2722537"/>
-            <a:ext cx="933174" cy="380641"/>
+            <a:off x="4133801" y="2722537"/>
+            <a:ext cx="1031605" cy="380641"/>
             <a:chOff x="4934192" y="1056229"/>
-            <a:chExt cx="1156890" cy="444628"/>
+            <a:chExt cx="1278918" cy="444628"/>
           </a:xfrm>
         </p:grpSpPr>
         <p:sp>
@@ -5610,8 +5610,8 @@
           </p:nvSpPr>
           <p:spPr>
             <a:xfrm>
-              <a:off x="5761184" y="1080554"/>
-              <a:ext cx="329898" cy="117099"/>
+              <a:off x="5883212" y="1068802"/>
+              <a:ext cx="329898" cy="128377"/>
             </a:xfrm>
             <a:prstGeom prst="rect">
               <a:avLst/>
@@ -5645,7 +5645,7 @@
                 <a:buNone/>
               </a:pPr>
               <a:r>
-                <a:rPr lang="en-US" sz="714" b="1" i="0" u="none" strike="noStrike" cap="none">
+                <a:rPr lang="en-US" sz="714" b="1" i="0" u="none" strike="noStrike" cap="none" dirty="0">
                   <a:solidFill>
                     <a:srgbClr val="FFFFFF"/>
                   </a:solidFill>
@@ -5654,9 +5654,9 @@
                   <a:cs typeface="Arial"/>
                   <a:sym typeface="Arial"/>
                 </a:rPr>
-                <a:t>(unit)</a:t>
+                <a:t>($)</a:t>
               </a:r>
-              <a:endParaRPr sz="1400" b="0" i="0" u="none" strike="noStrike" cap="none">
+              <a:endParaRPr sz="1400" b="0" i="0" u="none" strike="noStrike" cap="none" dirty="0">
                 <a:solidFill>
                   <a:srgbClr val="000000"/>
                 </a:solidFill>
@@ -6358,7 +6358,7 @@
         </p:nvGrpSpPr>
         <p:grpSpPr>
           <a:xfrm>
-            <a:off x="5856175" y="945964"/>
+            <a:off x="5659325" y="945964"/>
             <a:ext cx="1814626" cy="381414"/>
             <a:chOff x="4934192" y="1056229"/>
             <a:chExt cx="1262461" cy="444628"/>
@@ -6625,7 +6625,7 @@
         </p:nvGrpSpPr>
         <p:grpSpPr>
           <a:xfrm>
-            <a:off x="5865217" y="1508192"/>
+            <a:off x="5668367" y="1508192"/>
             <a:ext cx="1805583" cy="280302"/>
             <a:chOff x="4934192" y="1056229"/>
             <a:chExt cx="1261219" cy="444628"/>
@@ -6901,7 +6901,7 @@
         <p:spPr>
           <a:xfrm flipV="1">
             <a:off x="5040430" y="1094128"/>
-            <a:ext cx="815745" cy="1003093"/>
+            <a:ext cx="618895" cy="1003093"/>
           </a:xfrm>
           <a:prstGeom prst="bentConnector3">
             <a:avLst>
@@ -6932,7 +6932,7 @@
         <p:spPr>
           <a:xfrm flipV="1">
             <a:off x="5040430" y="1591554"/>
-            <a:ext cx="824787" cy="505667"/>
+            <a:ext cx="627937" cy="505667"/>
           </a:xfrm>
           <a:prstGeom prst="bentConnector3">
             <a:avLst>
@@ -10773,8 +10773,8 @@
         </p:nvGrpSpPr>
         <p:grpSpPr>
           <a:xfrm>
-            <a:off x="5890670" y="5045784"/>
-            <a:ext cx="1149096" cy="425777"/>
+            <a:off x="5932560" y="5267985"/>
+            <a:ext cx="1666403" cy="425777"/>
             <a:chOff x="4934191" y="1056225"/>
             <a:chExt cx="1131760" cy="444632"/>
           </a:xfrm>
@@ -10998,6 +10998,7 @@
             </a:extLst>
           </p:cNvPr>
           <p:cNvCxnSpPr>
+            <a:cxnSpLocks/>
             <a:stCxn id="150" idx="3"/>
           </p:cNvCxnSpPr>
           <p:nvPr/>
@@ -11005,7 +11006,7 @@
         <p:spPr>
           <a:xfrm>
             <a:off x="5097635" y="5171891"/>
-            <a:ext cx="744263" cy="85366"/>
+            <a:ext cx="1198383" cy="322333"/>
           </a:xfrm>
           <a:prstGeom prst="bentConnector3">
             <a:avLst/>

</xml_diff>